<commit_message>
Update Milestone 2 Presentation.pptx
</commit_message>
<xml_diff>
--- a/Milestone 2 Presentation.pptx
+++ b/Milestone 2 Presentation.pptx
@@ -15,6 +15,7 @@
     <p:sldId id="264" r:id="rId9"/>
     <p:sldId id="265" r:id="rId10"/>
     <p:sldId id="266" r:id="rId11"/>
+    <p:sldId id="267" r:id="rId12"/>
   </p:sldIdLst>
   <p:sldSz cx="12192000" cy="6858000"/>
   <p:notesSz cx="6858000" cy="9144000"/>
@@ -113,6 +114,11 @@
       </a:defRPr>
     </a:lvl9pPr>
   </p:defaultTextStyle>
+  <p:extLst>
+    <p:ext uri="{EFAFB233-063F-42B5-8137-9DF3F51BA10A}">
+      <p15:sldGuideLst xmlns:p15="http://schemas.microsoft.com/office/powerpoint/2012/main"/>
+    </p:ext>
+  </p:extLst>
 </p:presentation>
 </file>
 
@@ -6513,6 +6519,96 @@
 </p:sld>
 </file>
 
+<file path=ppt/slides/slide11.xml><?xml version="1.0" encoding="utf-8"?>
+<p:sld xmlns:a="http://schemas.openxmlformats.org/drawingml/2006/main" xmlns:r="http://schemas.openxmlformats.org/officeDocument/2006/relationships" xmlns:p="http://schemas.openxmlformats.org/presentationml/2006/main">
+  <p:cSld>
+    <p:spTree>
+      <p:nvGrpSpPr>
+        <p:cNvPr id="1" name=""/>
+        <p:cNvGrpSpPr/>
+        <p:nvPr/>
+      </p:nvGrpSpPr>
+      <p:grpSpPr>
+        <a:xfrm>
+          <a:off x="0" y="0"/>
+          <a:ext cx="0" cy="0"/>
+          <a:chOff x="0" y="0"/>
+          <a:chExt cx="0" cy="0"/>
+        </a:xfrm>
+      </p:grpSpPr>
+      <p:sp>
+        <p:nvSpPr>
+          <p:cNvPr id="2" name="Title 1">
+            <a:extLst>
+              <a:ext uri="{FF2B5EF4-FFF2-40B4-BE49-F238E27FC236}">
+                <a16:creationId xmlns:a16="http://schemas.microsoft.com/office/drawing/2014/main" id="{8030BCE0-85EB-4DE8-B88F-F3D6CE1611CA}"/>
+              </a:ext>
+            </a:extLst>
+          </p:cNvPr>
+          <p:cNvSpPr>
+            <a:spLocks noGrp="1"/>
+          </p:cNvSpPr>
+          <p:nvPr>
+            <p:ph type="title"/>
+          </p:nvPr>
+        </p:nvSpPr>
+        <p:spPr/>
+        <p:txBody>
+          <a:bodyPr/>
+          <a:lstStyle/>
+          <a:p>
+            <a:r>
+              <a:rPr lang="en-CA" dirty="0"/>
+              <a:t>Storage</a:t>
+            </a:r>
+          </a:p>
+        </p:txBody>
+      </p:sp>
+      <p:sp>
+        <p:nvSpPr>
+          <p:cNvPr id="3" name="Content Placeholder 2">
+            <a:extLst>
+              <a:ext uri="{FF2B5EF4-FFF2-40B4-BE49-F238E27FC236}">
+                <a16:creationId xmlns:a16="http://schemas.microsoft.com/office/drawing/2014/main" id="{074A8601-A539-4237-B373-E1B87ECA6E73}"/>
+              </a:ext>
+            </a:extLst>
+          </p:cNvPr>
+          <p:cNvSpPr>
+            <a:spLocks noGrp="1"/>
+          </p:cNvSpPr>
+          <p:nvPr>
+            <p:ph idx="1"/>
+          </p:nvPr>
+        </p:nvSpPr>
+        <p:spPr/>
+        <p:txBody>
+          <a:bodyPr/>
+          <a:lstStyle/>
+          <a:p>
+            <a:r>
+              <a:rPr lang="en-CA" dirty="0"/>
+              <a:t>Each time the live data is pulled from the APIs, it will be store in a table and updated each time the user refreshed </a:t>
+            </a:r>
+            <a:r>
+              <a:rPr lang="en-CA"/>
+              <a:t>the application.</a:t>
+            </a:r>
+          </a:p>
+        </p:txBody>
+      </p:sp>
+    </p:spTree>
+    <p:extLst>
+      <p:ext uri="{BB962C8B-B14F-4D97-AF65-F5344CB8AC3E}">
+        <p14:creationId xmlns:p14="http://schemas.microsoft.com/office/powerpoint/2010/main" val="4264610213"/>
+      </p:ext>
+    </p:extLst>
+  </p:cSld>
+  <p:clrMapOvr>
+    <a:masterClrMapping/>
+  </p:clrMapOvr>
+</p:sld>
+</file>
+
 <file path=ppt/slides/slide2.xml><?xml version="1.0" encoding="utf-8"?>
 <p:sld xmlns:a="http://schemas.openxmlformats.org/drawingml/2006/main" xmlns:r="http://schemas.openxmlformats.org/officeDocument/2006/relationships" xmlns:p="http://schemas.openxmlformats.org/presentationml/2006/main">
   <p:cSld>

</xml_diff>

<commit_message>
Revert "Merge branch 'master' of https://github.com/TsidAznar/WAPCENG319"
This reverts commit f4205001d470375e4b0a50ccd09cec38ea4b7944, reversing
changes made to dfb9f7ccd9e22ec15acc64d20a04dd1da06c019b.
</commit_message>
<xml_diff>
--- a/Milestone 2 Presentation.pptx
+++ b/Milestone 2 Presentation.pptx
@@ -308,7 +308,7 @@
           <a:p>
             <a:fld id="{09269806-7F87-4C76-B288-F90ED5BB92A3}" type="datetimeFigureOut">
               <a:rPr lang="en-CA" smtClean="0"/>
-              <a:t>11/18/2020</a:t>
+              <a:t>11/14/2020</a:t>
             </a:fld>
             <a:endParaRPr lang="en-CA"/>
           </a:p>
@@ -583,7 +583,7 @@
           <a:p>
             <a:fld id="{09269806-7F87-4C76-B288-F90ED5BB92A3}" type="datetimeFigureOut">
               <a:rPr lang="en-CA" smtClean="0"/>
-              <a:t>11/18/2020</a:t>
+              <a:t>11/14/2020</a:t>
             </a:fld>
             <a:endParaRPr lang="en-CA"/>
           </a:p>
@@ -777,7 +777,7 @@
           <a:p>
             <a:fld id="{09269806-7F87-4C76-B288-F90ED5BB92A3}" type="datetimeFigureOut">
               <a:rPr lang="en-CA" smtClean="0"/>
-              <a:t>11/18/2020</a:t>
+              <a:t>11/14/2020</a:t>
             </a:fld>
             <a:endParaRPr lang="en-CA"/>
           </a:p>
@@ -1050,7 +1050,7 @@
           <a:p>
             <a:fld id="{09269806-7F87-4C76-B288-F90ED5BB92A3}" type="datetimeFigureOut">
               <a:rPr lang="en-CA" smtClean="0"/>
-              <a:t>11/18/2020</a:t>
+              <a:t>11/14/2020</a:t>
             </a:fld>
             <a:endParaRPr lang="en-CA"/>
           </a:p>
@@ -1391,7 +1391,7 @@
           <a:p>
             <a:fld id="{09269806-7F87-4C76-B288-F90ED5BB92A3}" type="datetimeFigureOut">
               <a:rPr lang="en-CA" smtClean="0"/>
-              <a:t>11/18/2020</a:t>
+              <a:t>11/14/2020</a:t>
             </a:fld>
             <a:endParaRPr lang="en-CA"/>
           </a:p>
@@ -2014,7 +2014,7 @@
           <a:p>
             <a:fld id="{09269806-7F87-4C76-B288-F90ED5BB92A3}" type="datetimeFigureOut">
               <a:rPr lang="en-CA" smtClean="0"/>
-              <a:t>11/18/2020</a:t>
+              <a:t>11/14/2020</a:t>
             </a:fld>
             <a:endParaRPr lang="en-CA"/>
           </a:p>
@@ -2874,7 +2874,7 @@
           <a:p>
             <a:fld id="{09269806-7F87-4C76-B288-F90ED5BB92A3}" type="datetimeFigureOut">
               <a:rPr lang="en-CA" smtClean="0"/>
-              <a:t>11/18/2020</a:t>
+              <a:t>11/14/2020</a:t>
             </a:fld>
             <a:endParaRPr lang="en-CA"/>
           </a:p>
@@ -3044,7 +3044,7 @@
           <a:p>
             <a:fld id="{09269806-7F87-4C76-B288-F90ED5BB92A3}" type="datetimeFigureOut">
               <a:rPr lang="en-CA" smtClean="0"/>
-              <a:t>11/18/2020</a:t>
+              <a:t>11/14/2020</a:t>
             </a:fld>
             <a:endParaRPr lang="en-CA"/>
           </a:p>
@@ -3224,7 +3224,7 @@
           <a:p>
             <a:fld id="{09269806-7F87-4C76-B288-F90ED5BB92A3}" type="datetimeFigureOut">
               <a:rPr lang="en-CA" smtClean="0"/>
-              <a:t>11/18/2020</a:t>
+              <a:t>11/14/2020</a:t>
             </a:fld>
             <a:endParaRPr lang="en-CA"/>
           </a:p>
@@ -3394,7 +3394,7 @@
           <a:p>
             <a:fld id="{09269806-7F87-4C76-B288-F90ED5BB92A3}" type="datetimeFigureOut">
               <a:rPr lang="en-CA" smtClean="0"/>
-              <a:t>11/18/2020</a:t>
+              <a:t>11/14/2020</a:t>
             </a:fld>
             <a:endParaRPr lang="en-CA"/>
           </a:p>
@@ -3641,7 +3641,7 @@
           <a:p>
             <a:fld id="{09269806-7F87-4C76-B288-F90ED5BB92A3}" type="datetimeFigureOut">
               <a:rPr lang="en-CA" smtClean="0"/>
-              <a:t>11/18/2020</a:t>
+              <a:t>11/14/2020</a:t>
             </a:fld>
             <a:endParaRPr lang="en-CA"/>
           </a:p>
@@ -3933,7 +3933,7 @@
           <a:p>
             <a:fld id="{09269806-7F87-4C76-B288-F90ED5BB92A3}" type="datetimeFigureOut">
               <a:rPr lang="en-CA" smtClean="0"/>
-              <a:t>11/18/2020</a:t>
+              <a:t>11/14/2020</a:t>
             </a:fld>
             <a:endParaRPr lang="en-CA"/>
           </a:p>
@@ -4377,7 +4377,7 @@
           <a:p>
             <a:fld id="{09269806-7F87-4C76-B288-F90ED5BB92A3}" type="datetimeFigureOut">
               <a:rPr lang="en-CA" smtClean="0"/>
-              <a:t>11/18/2020</a:t>
+              <a:t>11/14/2020</a:t>
             </a:fld>
             <a:endParaRPr lang="en-CA"/>
           </a:p>
@@ -4495,7 +4495,7 @@
           <a:p>
             <a:fld id="{09269806-7F87-4C76-B288-F90ED5BB92A3}" type="datetimeFigureOut">
               <a:rPr lang="en-CA" smtClean="0"/>
-              <a:t>11/18/2020</a:t>
+              <a:t>11/14/2020</a:t>
             </a:fld>
             <a:endParaRPr lang="en-CA"/>
           </a:p>
@@ -4590,7 +4590,7 @@
           <a:p>
             <a:fld id="{09269806-7F87-4C76-B288-F90ED5BB92A3}" type="datetimeFigureOut">
               <a:rPr lang="en-CA" smtClean="0"/>
-              <a:t>11/18/2020</a:t>
+              <a:t>11/14/2020</a:t>
             </a:fld>
             <a:endParaRPr lang="en-CA"/>
           </a:p>
@@ -4869,7 +4869,7 @@
           <a:p>
             <a:fld id="{09269806-7F87-4C76-B288-F90ED5BB92A3}" type="datetimeFigureOut">
               <a:rPr lang="en-CA" smtClean="0"/>
-              <a:t>11/18/2020</a:t>
+              <a:t>11/14/2020</a:t>
             </a:fld>
             <a:endParaRPr lang="en-CA"/>
           </a:p>
@@ -5144,7 +5144,7 @@
           <a:p>
             <a:fld id="{09269806-7F87-4C76-B288-F90ED5BB92A3}" type="datetimeFigureOut">
               <a:rPr lang="en-CA" smtClean="0"/>
-              <a:t>11/18/2020</a:t>
+              <a:t>11/14/2020</a:t>
             </a:fld>
             <a:endParaRPr lang="en-CA"/>
           </a:p>
@@ -5573,7 +5573,7 @@
           <a:p>
             <a:fld id="{09269806-7F87-4C76-B288-F90ED5BB92A3}" type="datetimeFigureOut">
               <a:rPr lang="en-CA" smtClean="0"/>
-              <a:t>11/18/2020</a:t>
+              <a:t>11/14/2020</a:t>
             </a:fld>
             <a:endParaRPr lang="en-CA"/>
           </a:p>
@@ -6522,30 +6522,6 @@
 <file path=ppt/slides/slide11.xml><?xml version="1.0" encoding="utf-8"?>
 <p:sld xmlns:a="http://schemas.openxmlformats.org/drawingml/2006/main" xmlns:r="http://schemas.openxmlformats.org/officeDocument/2006/relationships" xmlns:p="http://schemas.openxmlformats.org/presentationml/2006/main">
   <p:cSld>
-    <p:bg>
-      <p:bgPr>
-        <a:blipFill rotWithShape="1">
-          <a:blip r:embed="rId2">
-            <a:duotone>
-              <a:schemeClr val="bg2">
-                <a:shade val="69000"/>
-                <a:hueMod val="108000"/>
-                <a:satMod val="164000"/>
-                <a:lumMod val="74000"/>
-              </a:schemeClr>
-              <a:schemeClr val="bg2">
-                <a:tint val="96000"/>
-                <a:hueMod val="88000"/>
-                <a:satMod val="140000"/>
-                <a:lumMod val="132000"/>
-              </a:schemeClr>
-            </a:duotone>
-          </a:blip>
-          <a:stretch/>
-        </a:blipFill>
-        <a:effectLst/>
-      </p:bgPr>
-    </p:bg>
     <p:spTree>
       <p:nvGrpSpPr>
         <p:cNvPr id="1" name=""/>
@@ -6576,16 +6552,9 @@
             <p:ph type="title"/>
           </p:nvPr>
         </p:nvSpPr>
-        <p:spPr>
-          <a:xfrm>
-            <a:off x="646111" y="452718"/>
-            <a:ext cx="9404723" cy="1400530"/>
-          </a:xfrm>
-        </p:spPr>
-        <p:txBody>
-          <a:bodyPr>
-            <a:normAutofit/>
-          </a:bodyPr>
+        <p:spPr/>
+        <p:txBody>
+          <a:bodyPr/>
           <a:lstStyle/>
           <a:p>
             <a:r>
@@ -6611,16 +6580,9 @@
             <p:ph idx="1"/>
           </p:nvPr>
         </p:nvSpPr>
-        <p:spPr>
-          <a:xfrm>
-            <a:off x="1103313" y="2052918"/>
-            <a:ext cx="3300836" cy="4195481"/>
-          </a:xfrm>
-        </p:spPr>
-        <p:txBody>
-          <a:bodyPr>
-            <a:normAutofit/>
-          </a:bodyPr>
+        <p:spPr/>
+        <p:txBody>
+          <a:bodyPr/>
           <a:lstStyle/>
           <a:p>
             <a:r>
@@ -6634,78 +6596,6 @@
           </a:p>
         </p:txBody>
       </p:sp>
-      <p:pic>
-        <p:nvPicPr>
-          <p:cNvPr id="4" name="Picture 3">
-            <a:extLst>
-              <a:ext uri="{FF2B5EF4-FFF2-40B4-BE49-F238E27FC236}">
-                <a16:creationId xmlns:a16="http://schemas.microsoft.com/office/drawing/2014/main" id="{5786F9B7-3813-40B7-AD5C-A40BF5A113F4}"/>
-              </a:ext>
-            </a:extLst>
-          </p:cNvPr>
-          <p:cNvPicPr>
-            <a:picLocks noChangeAspect="1"/>
-          </p:cNvPicPr>
-          <p:nvPr/>
-        </p:nvPicPr>
-        <p:blipFill rotWithShape="1">
-          <a:blip r:embed="rId3"/>
-          <a:srcRect r="1" b="6659"/>
-          <a:stretch/>
-        </p:blipFill>
-        <p:spPr>
-          <a:xfrm>
-            <a:off x="6311593" y="1239895"/>
-            <a:ext cx="2695025" cy="4637027"/>
-          </a:xfrm>
-          <a:prstGeom prst="rect">
-            <a:avLst/>
-          </a:prstGeom>
-          <a:effectLst>
-            <a:outerShdw blurRad="50800" dist="38100" dir="5400000" algn="t" rotWithShape="0">
-              <a:prstClr val="black">
-                <a:alpha val="43000"/>
-              </a:prstClr>
-            </a:outerShdw>
-          </a:effectLst>
-        </p:spPr>
-      </p:pic>
-      <p:pic>
-        <p:nvPicPr>
-          <p:cNvPr id="5" name="Picture 4">
-            <a:extLst>
-              <a:ext uri="{FF2B5EF4-FFF2-40B4-BE49-F238E27FC236}">
-                <a16:creationId xmlns:a16="http://schemas.microsoft.com/office/drawing/2014/main" id="{041691EE-D0B5-44B1-A6E7-337720F9EB41}"/>
-              </a:ext>
-            </a:extLst>
-          </p:cNvPr>
-          <p:cNvPicPr>
-            <a:picLocks noChangeAspect="1"/>
-          </p:cNvPicPr>
-          <p:nvPr/>
-        </p:nvPicPr>
-        <p:blipFill rotWithShape="1">
-          <a:blip r:embed="rId4"/>
-          <a:srcRect t="6601" r="-1" b="678"/>
-          <a:stretch/>
-        </p:blipFill>
-        <p:spPr>
-          <a:xfrm>
-            <a:off x="9186614" y="1239895"/>
-            <a:ext cx="2700585" cy="4637027"/>
-          </a:xfrm>
-          <a:prstGeom prst="rect">
-            <a:avLst/>
-          </a:prstGeom>
-          <a:effectLst>
-            <a:outerShdw blurRad="50800" dist="38100" dir="5400000" algn="t" rotWithShape="0">
-              <a:prstClr val="black">
-                <a:alpha val="43000"/>
-              </a:prstClr>
-            </a:outerShdw>
-          </a:effectLst>
-        </p:spPr>
-      </p:pic>
     </p:spTree>
     <p:extLst>
       <p:ext uri="{BB962C8B-B14F-4D97-AF65-F5344CB8AC3E}">

</xml_diff>